<commit_message>
Mudanca de pano de fundo do PITCH
</commit_message>
<xml_diff>
--- a/PastaDocumentos/Pitch-Projeto.pptx
+++ b/PastaDocumentos/Pitch-Projeto.pptx
@@ -104,6 +104,11 @@
       </a:defRPr>
     </a:lvl9pPr>
   </p:defaultTextStyle>
+  <p:extLst>
+    <p:ext uri="{EFAFB233-063F-42B5-8137-9DF3F51BA10A}">
+      <p15:sldGuideLst xmlns:p15="http://schemas.microsoft.com/office/powerpoint/2012/main"/>
+    </p:ext>
+  </p:extLst>
 </p:presentation>
 </file>
 
@@ -3307,6 +3312,36 @@
 <file path=ppt/slides/slide1.xml><?xml version="1.0" encoding="utf-8"?>
 <p:sld xmlns:a="http://schemas.openxmlformats.org/drawingml/2006/main" xmlns:r="http://schemas.openxmlformats.org/officeDocument/2006/relationships" xmlns:p="http://schemas.openxmlformats.org/presentationml/2006/main">
   <p:cSld>
+    <p:bg>
+      <p:bgPr>
+        <a:gradFill flip="none" rotWithShape="1">
+          <a:gsLst>
+            <a:gs pos="0">
+              <a:schemeClr val="accent2">
+                <a:lumMod val="40000"/>
+                <a:lumOff val="60000"/>
+              </a:schemeClr>
+            </a:gs>
+            <a:gs pos="46000">
+              <a:schemeClr val="accent2">
+                <a:lumMod val="95000"/>
+                <a:lumOff val="5000"/>
+              </a:schemeClr>
+            </a:gs>
+            <a:gs pos="100000">
+              <a:schemeClr val="accent2">
+                <a:lumMod val="60000"/>
+              </a:schemeClr>
+            </a:gs>
+          </a:gsLst>
+          <a:path path="circle">
+            <a:fillToRect l="50000" t="130000" r="50000" b="-30000"/>
+          </a:path>
+          <a:tileRect/>
+        </a:gradFill>
+        <a:effectLst/>
+      </p:bgPr>
+    </p:bg>
     <p:spTree>
       <p:nvGrpSpPr>
         <p:cNvPr id="1" name=""/>

</xml_diff>

<commit_message>
Colocacao de LOGO em arquivo recuperado
</commit_message>
<xml_diff>
--- a/PastaDocumentos/Pitch-Projeto.pptx
+++ b/PastaDocumentos/Pitch-Projeto.pptx
@@ -3312,36 +3312,6 @@
 <file path=ppt/slides/slide1.xml><?xml version="1.0" encoding="utf-8"?>
 <p:sld xmlns:a="http://schemas.openxmlformats.org/drawingml/2006/main" xmlns:r="http://schemas.openxmlformats.org/officeDocument/2006/relationships" xmlns:p="http://schemas.openxmlformats.org/presentationml/2006/main">
   <p:cSld>
-    <p:bg>
-      <p:bgPr>
-        <a:gradFill flip="none" rotWithShape="1">
-          <a:gsLst>
-            <a:gs pos="0">
-              <a:schemeClr val="accent2">
-                <a:lumMod val="40000"/>
-                <a:lumOff val="60000"/>
-              </a:schemeClr>
-            </a:gs>
-            <a:gs pos="46000">
-              <a:schemeClr val="accent2">
-                <a:lumMod val="95000"/>
-                <a:lumOff val="5000"/>
-              </a:schemeClr>
-            </a:gs>
-            <a:gs pos="100000">
-              <a:schemeClr val="accent2">
-                <a:lumMod val="60000"/>
-              </a:schemeClr>
-            </a:gs>
-          </a:gsLst>
-          <a:path path="circle">
-            <a:fillToRect l="50000" t="130000" r="50000" b="-30000"/>
-          </a:path>
-          <a:tileRect/>
-        </a:gradFill>
-        <a:effectLst/>
-      </p:bgPr>
-    </p:bg>
     <p:spTree>
       <p:nvGrpSpPr>
         <p:cNvPr id="1" name=""/>
@@ -3408,6 +3378,55 @@
             <a:r>
               <a:rPr lang="pt-BR" dirty="0"/>
               <a:t>Projeto exemplo GIT – 2SIPF</a:t>
+            </a:r>
+          </a:p>
+        </p:txBody>
+      </p:sp>
+      <p:sp>
+        <p:nvSpPr>
+          <p:cNvPr id="4" name="Elipse 3">
+            <a:extLst>
+              <a:ext uri="{FF2B5EF4-FFF2-40B4-BE49-F238E27FC236}">
+                <a16:creationId xmlns:a16="http://schemas.microsoft.com/office/drawing/2014/main" id="{D2122B22-E572-8B33-0011-63EAC2145ABE}"/>
+              </a:ext>
+            </a:extLst>
+          </p:cNvPr>
+          <p:cNvSpPr/>
+          <p:nvPr/>
+        </p:nvSpPr>
+        <p:spPr>
+          <a:xfrm>
+            <a:off x="8487177" y="579549"/>
+            <a:ext cx="1571223" cy="1493950"/>
+          </a:xfrm>
+          <a:prstGeom prst="ellipse">
+            <a:avLst/>
+          </a:prstGeom>
+        </p:spPr>
+        <p:style>
+          <a:lnRef idx="2">
+            <a:schemeClr val="accent1">
+              <a:shade val="15000"/>
+            </a:schemeClr>
+          </a:lnRef>
+          <a:fillRef idx="1">
+            <a:schemeClr val="accent1"/>
+          </a:fillRef>
+          <a:effectRef idx="0">
+            <a:schemeClr val="accent1"/>
+          </a:effectRef>
+          <a:fontRef idx="minor">
+            <a:schemeClr val="lt1"/>
+          </a:fontRef>
+        </p:style>
+        <p:txBody>
+          <a:bodyPr rtlCol="0" anchor="ctr"/>
+          <a:lstStyle/>
+          <a:p>
+            <a:pPr algn="ctr"/>
+            <a:r>
+              <a:rPr lang="pt-BR" dirty="0"/>
+              <a:t>LOGO PROJETO</a:t>
             </a:r>
           </a:p>
         </p:txBody>

</xml_diff>

<commit_message>
Mudou logo para laranja no REMOTO
</commit_message>
<xml_diff>
--- a/PastaDocumentos/Pitch-Projeto.pptx
+++ b/PastaDocumentos/Pitch-Projeto.pptx
@@ -259,7 +259,7 @@
           <a:p>
             <a:fld id="{09B00126-DADF-4276-BADD-8F887AE54F8D}" type="datetimeFigureOut">
               <a:rPr lang="pt-BR" smtClean="0"/>
-              <a:t>11/04/2024</a:t>
+              <a:t>10/04/2025</a:t>
             </a:fld>
             <a:endParaRPr lang="pt-BR"/>
           </a:p>
@@ -313,7 +313,7 @@
           <a:p>
             <a:fld id="{6F66E989-D2E7-4723-8871-1C322884978C}" type="slidenum">
               <a:rPr lang="pt-BR" smtClean="0"/>
-              <a:t>‹nº›</a:t>
+              <a:t>‹#›</a:t>
             </a:fld>
             <a:endParaRPr lang="pt-BR"/>
           </a:p>
@@ -457,7 +457,7 @@
           <a:p>
             <a:fld id="{09B00126-DADF-4276-BADD-8F887AE54F8D}" type="datetimeFigureOut">
               <a:rPr lang="pt-BR" smtClean="0"/>
-              <a:t>11/04/2024</a:t>
+              <a:t>10/04/2025</a:t>
             </a:fld>
             <a:endParaRPr lang="pt-BR"/>
           </a:p>
@@ -511,7 +511,7 @@
           <a:p>
             <a:fld id="{6F66E989-D2E7-4723-8871-1C322884978C}" type="slidenum">
               <a:rPr lang="pt-BR" smtClean="0"/>
-              <a:t>‹nº›</a:t>
+              <a:t>‹#›</a:t>
             </a:fld>
             <a:endParaRPr lang="pt-BR"/>
           </a:p>
@@ -665,7 +665,7 @@
           <a:p>
             <a:fld id="{09B00126-DADF-4276-BADD-8F887AE54F8D}" type="datetimeFigureOut">
               <a:rPr lang="pt-BR" smtClean="0"/>
-              <a:t>11/04/2024</a:t>
+              <a:t>10/04/2025</a:t>
             </a:fld>
             <a:endParaRPr lang="pt-BR"/>
           </a:p>
@@ -719,7 +719,7 @@
           <a:p>
             <a:fld id="{6F66E989-D2E7-4723-8871-1C322884978C}" type="slidenum">
               <a:rPr lang="pt-BR" smtClean="0"/>
-              <a:t>‹nº›</a:t>
+              <a:t>‹#›</a:t>
             </a:fld>
             <a:endParaRPr lang="pt-BR"/>
           </a:p>
@@ -863,7 +863,7 @@
           <a:p>
             <a:fld id="{09B00126-DADF-4276-BADD-8F887AE54F8D}" type="datetimeFigureOut">
               <a:rPr lang="pt-BR" smtClean="0"/>
-              <a:t>11/04/2024</a:t>
+              <a:t>10/04/2025</a:t>
             </a:fld>
             <a:endParaRPr lang="pt-BR"/>
           </a:p>
@@ -917,7 +917,7 @@
           <a:p>
             <a:fld id="{6F66E989-D2E7-4723-8871-1C322884978C}" type="slidenum">
               <a:rPr lang="pt-BR" smtClean="0"/>
-              <a:t>‹nº›</a:t>
+              <a:t>‹#›</a:t>
             </a:fld>
             <a:endParaRPr lang="pt-BR"/>
           </a:p>
@@ -1138,7 +1138,7 @@
           <a:p>
             <a:fld id="{09B00126-DADF-4276-BADD-8F887AE54F8D}" type="datetimeFigureOut">
               <a:rPr lang="pt-BR" smtClean="0"/>
-              <a:t>11/04/2024</a:t>
+              <a:t>10/04/2025</a:t>
             </a:fld>
             <a:endParaRPr lang="pt-BR"/>
           </a:p>
@@ -1192,7 +1192,7 @@
           <a:p>
             <a:fld id="{6F66E989-D2E7-4723-8871-1C322884978C}" type="slidenum">
               <a:rPr lang="pt-BR" smtClean="0"/>
-              <a:t>‹nº›</a:t>
+              <a:t>‹#›</a:t>
             </a:fld>
             <a:endParaRPr lang="pt-BR"/>
           </a:p>
@@ -1403,7 +1403,7 @@
           <a:p>
             <a:fld id="{09B00126-DADF-4276-BADD-8F887AE54F8D}" type="datetimeFigureOut">
               <a:rPr lang="pt-BR" smtClean="0"/>
-              <a:t>11/04/2024</a:t>
+              <a:t>10/04/2025</a:t>
             </a:fld>
             <a:endParaRPr lang="pt-BR"/>
           </a:p>
@@ -1457,7 +1457,7 @@
           <a:p>
             <a:fld id="{6F66E989-D2E7-4723-8871-1C322884978C}" type="slidenum">
               <a:rPr lang="pt-BR" smtClean="0"/>
-              <a:t>‹nº›</a:t>
+              <a:t>‹#›</a:t>
             </a:fld>
             <a:endParaRPr lang="pt-BR"/>
           </a:p>
@@ -1815,7 +1815,7 @@
           <a:p>
             <a:fld id="{09B00126-DADF-4276-BADD-8F887AE54F8D}" type="datetimeFigureOut">
               <a:rPr lang="pt-BR" smtClean="0"/>
-              <a:t>11/04/2024</a:t>
+              <a:t>10/04/2025</a:t>
             </a:fld>
             <a:endParaRPr lang="pt-BR"/>
           </a:p>
@@ -1869,7 +1869,7 @@
           <a:p>
             <a:fld id="{6F66E989-D2E7-4723-8871-1C322884978C}" type="slidenum">
               <a:rPr lang="pt-BR" smtClean="0"/>
-              <a:t>‹nº›</a:t>
+              <a:t>‹#›</a:t>
             </a:fld>
             <a:endParaRPr lang="pt-BR"/>
           </a:p>
@@ -1956,7 +1956,7 @@
           <a:p>
             <a:fld id="{09B00126-DADF-4276-BADD-8F887AE54F8D}" type="datetimeFigureOut">
               <a:rPr lang="pt-BR" smtClean="0"/>
-              <a:t>11/04/2024</a:t>
+              <a:t>10/04/2025</a:t>
             </a:fld>
             <a:endParaRPr lang="pt-BR"/>
           </a:p>
@@ -2010,7 +2010,7 @@
           <a:p>
             <a:fld id="{6F66E989-D2E7-4723-8871-1C322884978C}" type="slidenum">
               <a:rPr lang="pt-BR" smtClean="0"/>
-              <a:t>‹nº›</a:t>
+              <a:t>‹#›</a:t>
             </a:fld>
             <a:endParaRPr lang="pt-BR"/>
           </a:p>
@@ -2069,7 +2069,7 @@
           <a:p>
             <a:fld id="{09B00126-DADF-4276-BADD-8F887AE54F8D}" type="datetimeFigureOut">
               <a:rPr lang="pt-BR" smtClean="0"/>
-              <a:t>11/04/2024</a:t>
+              <a:t>10/04/2025</a:t>
             </a:fld>
             <a:endParaRPr lang="pt-BR"/>
           </a:p>
@@ -2123,7 +2123,7 @@
           <a:p>
             <a:fld id="{6F66E989-D2E7-4723-8871-1C322884978C}" type="slidenum">
               <a:rPr lang="pt-BR" smtClean="0"/>
-              <a:t>‹nº›</a:t>
+              <a:t>‹#›</a:t>
             </a:fld>
             <a:endParaRPr lang="pt-BR"/>
           </a:p>
@@ -2380,7 +2380,7 @@
           <a:p>
             <a:fld id="{09B00126-DADF-4276-BADD-8F887AE54F8D}" type="datetimeFigureOut">
               <a:rPr lang="pt-BR" smtClean="0"/>
-              <a:t>11/04/2024</a:t>
+              <a:t>10/04/2025</a:t>
             </a:fld>
             <a:endParaRPr lang="pt-BR"/>
           </a:p>
@@ -2434,7 +2434,7 @@
           <a:p>
             <a:fld id="{6F66E989-D2E7-4723-8871-1C322884978C}" type="slidenum">
               <a:rPr lang="pt-BR" smtClean="0"/>
-              <a:t>‹nº›</a:t>
+              <a:t>‹#›</a:t>
             </a:fld>
             <a:endParaRPr lang="pt-BR"/>
           </a:p>
@@ -2668,7 +2668,7 @@
           <a:p>
             <a:fld id="{09B00126-DADF-4276-BADD-8F887AE54F8D}" type="datetimeFigureOut">
               <a:rPr lang="pt-BR" smtClean="0"/>
-              <a:t>11/04/2024</a:t>
+              <a:t>10/04/2025</a:t>
             </a:fld>
             <a:endParaRPr lang="pt-BR"/>
           </a:p>
@@ -2722,7 +2722,7 @@
           <a:p>
             <a:fld id="{6F66E989-D2E7-4723-8871-1C322884978C}" type="slidenum">
               <a:rPr lang="pt-BR" smtClean="0"/>
-              <a:t>‹nº›</a:t>
+              <a:t>‹#›</a:t>
             </a:fld>
             <a:endParaRPr lang="pt-BR"/>
           </a:p>
@@ -2909,7 +2909,7 @@
           <a:p>
             <a:fld id="{09B00126-DADF-4276-BADD-8F887AE54F8D}" type="datetimeFigureOut">
               <a:rPr lang="pt-BR" smtClean="0"/>
-              <a:t>11/04/2024</a:t>
+              <a:t>10/04/2025</a:t>
             </a:fld>
             <a:endParaRPr lang="pt-BR"/>
           </a:p>
@@ -2999,7 +2999,7 @@
           <a:p>
             <a:fld id="{6F66E989-D2E7-4723-8871-1C322884978C}" type="slidenum">
               <a:rPr lang="pt-BR" smtClean="0"/>
-              <a:t>‹nº›</a:t>
+              <a:t>‹#›</a:t>
             </a:fld>
             <a:endParaRPr lang="pt-BR"/>
           </a:p>
@@ -3402,6 +3402,9 @@
           <a:prstGeom prst="ellipse">
             <a:avLst/>
           </a:prstGeom>
+          <a:solidFill>
+            <a:schemeClr val="accent2"/>
+          </a:solidFill>
         </p:spPr>
         <p:style>
           <a:lnRef idx="2">

</xml_diff>

<commit_message>
Mudanca logo para PRETO LOCAL
</commit_message>
<xml_diff>
--- a/PastaDocumentos/Pitch-Projeto.pptx
+++ b/PastaDocumentos/Pitch-Projeto.pptx
@@ -259,7 +259,7 @@
           <a:p>
             <a:fld id="{09B00126-DADF-4276-BADD-8F887AE54F8D}" type="datetimeFigureOut">
               <a:rPr lang="pt-BR" smtClean="0"/>
-              <a:t>11/04/2024</a:t>
+              <a:t>10/04/2025</a:t>
             </a:fld>
             <a:endParaRPr lang="pt-BR"/>
           </a:p>
@@ -313,7 +313,7 @@
           <a:p>
             <a:fld id="{6F66E989-D2E7-4723-8871-1C322884978C}" type="slidenum">
               <a:rPr lang="pt-BR" smtClean="0"/>
-              <a:t>‹nº›</a:t>
+              <a:t>‹#›</a:t>
             </a:fld>
             <a:endParaRPr lang="pt-BR"/>
           </a:p>
@@ -457,7 +457,7 @@
           <a:p>
             <a:fld id="{09B00126-DADF-4276-BADD-8F887AE54F8D}" type="datetimeFigureOut">
               <a:rPr lang="pt-BR" smtClean="0"/>
-              <a:t>11/04/2024</a:t>
+              <a:t>10/04/2025</a:t>
             </a:fld>
             <a:endParaRPr lang="pt-BR"/>
           </a:p>
@@ -511,7 +511,7 @@
           <a:p>
             <a:fld id="{6F66E989-D2E7-4723-8871-1C322884978C}" type="slidenum">
               <a:rPr lang="pt-BR" smtClean="0"/>
-              <a:t>‹nº›</a:t>
+              <a:t>‹#›</a:t>
             </a:fld>
             <a:endParaRPr lang="pt-BR"/>
           </a:p>
@@ -665,7 +665,7 @@
           <a:p>
             <a:fld id="{09B00126-DADF-4276-BADD-8F887AE54F8D}" type="datetimeFigureOut">
               <a:rPr lang="pt-BR" smtClean="0"/>
-              <a:t>11/04/2024</a:t>
+              <a:t>10/04/2025</a:t>
             </a:fld>
             <a:endParaRPr lang="pt-BR"/>
           </a:p>
@@ -719,7 +719,7 @@
           <a:p>
             <a:fld id="{6F66E989-D2E7-4723-8871-1C322884978C}" type="slidenum">
               <a:rPr lang="pt-BR" smtClean="0"/>
-              <a:t>‹nº›</a:t>
+              <a:t>‹#›</a:t>
             </a:fld>
             <a:endParaRPr lang="pt-BR"/>
           </a:p>
@@ -863,7 +863,7 @@
           <a:p>
             <a:fld id="{09B00126-DADF-4276-BADD-8F887AE54F8D}" type="datetimeFigureOut">
               <a:rPr lang="pt-BR" smtClean="0"/>
-              <a:t>11/04/2024</a:t>
+              <a:t>10/04/2025</a:t>
             </a:fld>
             <a:endParaRPr lang="pt-BR"/>
           </a:p>
@@ -917,7 +917,7 @@
           <a:p>
             <a:fld id="{6F66E989-D2E7-4723-8871-1C322884978C}" type="slidenum">
               <a:rPr lang="pt-BR" smtClean="0"/>
-              <a:t>‹nº›</a:t>
+              <a:t>‹#›</a:t>
             </a:fld>
             <a:endParaRPr lang="pt-BR"/>
           </a:p>
@@ -1138,7 +1138,7 @@
           <a:p>
             <a:fld id="{09B00126-DADF-4276-BADD-8F887AE54F8D}" type="datetimeFigureOut">
               <a:rPr lang="pt-BR" smtClean="0"/>
-              <a:t>11/04/2024</a:t>
+              <a:t>10/04/2025</a:t>
             </a:fld>
             <a:endParaRPr lang="pt-BR"/>
           </a:p>
@@ -1192,7 +1192,7 @@
           <a:p>
             <a:fld id="{6F66E989-D2E7-4723-8871-1C322884978C}" type="slidenum">
               <a:rPr lang="pt-BR" smtClean="0"/>
-              <a:t>‹nº›</a:t>
+              <a:t>‹#›</a:t>
             </a:fld>
             <a:endParaRPr lang="pt-BR"/>
           </a:p>
@@ -1403,7 +1403,7 @@
           <a:p>
             <a:fld id="{09B00126-DADF-4276-BADD-8F887AE54F8D}" type="datetimeFigureOut">
               <a:rPr lang="pt-BR" smtClean="0"/>
-              <a:t>11/04/2024</a:t>
+              <a:t>10/04/2025</a:t>
             </a:fld>
             <a:endParaRPr lang="pt-BR"/>
           </a:p>
@@ -1457,7 +1457,7 @@
           <a:p>
             <a:fld id="{6F66E989-D2E7-4723-8871-1C322884978C}" type="slidenum">
               <a:rPr lang="pt-BR" smtClean="0"/>
-              <a:t>‹nº›</a:t>
+              <a:t>‹#›</a:t>
             </a:fld>
             <a:endParaRPr lang="pt-BR"/>
           </a:p>
@@ -1815,7 +1815,7 @@
           <a:p>
             <a:fld id="{09B00126-DADF-4276-BADD-8F887AE54F8D}" type="datetimeFigureOut">
               <a:rPr lang="pt-BR" smtClean="0"/>
-              <a:t>11/04/2024</a:t>
+              <a:t>10/04/2025</a:t>
             </a:fld>
             <a:endParaRPr lang="pt-BR"/>
           </a:p>
@@ -1869,7 +1869,7 @@
           <a:p>
             <a:fld id="{6F66E989-D2E7-4723-8871-1C322884978C}" type="slidenum">
               <a:rPr lang="pt-BR" smtClean="0"/>
-              <a:t>‹nº›</a:t>
+              <a:t>‹#›</a:t>
             </a:fld>
             <a:endParaRPr lang="pt-BR"/>
           </a:p>
@@ -1956,7 +1956,7 @@
           <a:p>
             <a:fld id="{09B00126-DADF-4276-BADD-8F887AE54F8D}" type="datetimeFigureOut">
               <a:rPr lang="pt-BR" smtClean="0"/>
-              <a:t>11/04/2024</a:t>
+              <a:t>10/04/2025</a:t>
             </a:fld>
             <a:endParaRPr lang="pt-BR"/>
           </a:p>
@@ -2010,7 +2010,7 @@
           <a:p>
             <a:fld id="{6F66E989-D2E7-4723-8871-1C322884978C}" type="slidenum">
               <a:rPr lang="pt-BR" smtClean="0"/>
-              <a:t>‹nº›</a:t>
+              <a:t>‹#›</a:t>
             </a:fld>
             <a:endParaRPr lang="pt-BR"/>
           </a:p>
@@ -2069,7 +2069,7 @@
           <a:p>
             <a:fld id="{09B00126-DADF-4276-BADD-8F887AE54F8D}" type="datetimeFigureOut">
               <a:rPr lang="pt-BR" smtClean="0"/>
-              <a:t>11/04/2024</a:t>
+              <a:t>10/04/2025</a:t>
             </a:fld>
             <a:endParaRPr lang="pt-BR"/>
           </a:p>
@@ -2123,7 +2123,7 @@
           <a:p>
             <a:fld id="{6F66E989-D2E7-4723-8871-1C322884978C}" type="slidenum">
               <a:rPr lang="pt-BR" smtClean="0"/>
-              <a:t>‹nº›</a:t>
+              <a:t>‹#›</a:t>
             </a:fld>
             <a:endParaRPr lang="pt-BR"/>
           </a:p>
@@ -2380,7 +2380,7 @@
           <a:p>
             <a:fld id="{09B00126-DADF-4276-BADD-8F887AE54F8D}" type="datetimeFigureOut">
               <a:rPr lang="pt-BR" smtClean="0"/>
-              <a:t>11/04/2024</a:t>
+              <a:t>10/04/2025</a:t>
             </a:fld>
             <a:endParaRPr lang="pt-BR"/>
           </a:p>
@@ -2434,7 +2434,7 @@
           <a:p>
             <a:fld id="{6F66E989-D2E7-4723-8871-1C322884978C}" type="slidenum">
               <a:rPr lang="pt-BR" smtClean="0"/>
-              <a:t>‹nº›</a:t>
+              <a:t>‹#›</a:t>
             </a:fld>
             <a:endParaRPr lang="pt-BR"/>
           </a:p>
@@ -2668,7 +2668,7 @@
           <a:p>
             <a:fld id="{09B00126-DADF-4276-BADD-8F887AE54F8D}" type="datetimeFigureOut">
               <a:rPr lang="pt-BR" smtClean="0"/>
-              <a:t>11/04/2024</a:t>
+              <a:t>10/04/2025</a:t>
             </a:fld>
             <a:endParaRPr lang="pt-BR"/>
           </a:p>
@@ -2722,7 +2722,7 @@
           <a:p>
             <a:fld id="{6F66E989-D2E7-4723-8871-1C322884978C}" type="slidenum">
               <a:rPr lang="pt-BR" smtClean="0"/>
-              <a:t>‹nº›</a:t>
+              <a:t>‹#›</a:t>
             </a:fld>
             <a:endParaRPr lang="pt-BR"/>
           </a:p>
@@ -2909,7 +2909,7 @@
           <a:p>
             <a:fld id="{09B00126-DADF-4276-BADD-8F887AE54F8D}" type="datetimeFigureOut">
               <a:rPr lang="pt-BR" smtClean="0"/>
-              <a:t>11/04/2024</a:t>
+              <a:t>10/04/2025</a:t>
             </a:fld>
             <a:endParaRPr lang="pt-BR"/>
           </a:p>
@@ -2999,7 +2999,7 @@
           <a:p>
             <a:fld id="{6F66E989-D2E7-4723-8871-1C322884978C}" type="slidenum">
               <a:rPr lang="pt-BR" smtClean="0"/>
-              <a:t>‹nº›</a:t>
+              <a:t>‹#›</a:t>
             </a:fld>
             <a:endParaRPr lang="pt-BR"/>
           </a:p>
@@ -3402,6 +3402,9 @@
           <a:prstGeom prst="ellipse">
             <a:avLst/>
           </a:prstGeom>
+          <a:solidFill>
+            <a:srgbClr val="FF0000"/>
+          </a:solidFill>
         </p:spPr>
         <p:style>
           <a:lnRef idx="2">

</xml_diff>

<commit_message>
Mudou logo para verde DIRETO NO HUB
</commit_message>
<xml_diff>
--- a/PastaDocumentos/Pitch-Projeto.pptx
+++ b/PastaDocumentos/Pitch-Projeto.pptx
@@ -3403,7 +3403,9 @@
             <a:avLst/>
           </a:prstGeom>
           <a:solidFill>
-            <a:schemeClr val="accent2"/>
+            <a:schemeClr val="accent6">
+              <a:lumMod val="75000"/>
+            </a:schemeClr>
           </a:solidFill>
         </p:spPr>
         <p:style>

</xml_diff>